<commit_message>
week 5 ppt, class activity, hw
</commit_message>
<xml_diff>
--- a/course_material/week_04/week_04_presentation.pptx
+++ b/course_material/week_04/week_04_presentation.pptx
@@ -1839,7 +1839,7 @@
           <a:p>
             <a:fld id="{5CF9EFDB-215C-4120-ADCB-EAD745B7163E}" type="datetimeFigureOut">
               <a:rPr lang="en-US" smtClean="0"/>
-              <a:t>3/23/2021</a:t>
+              <a:t>3/24/2021</a:t>
             </a:fld>
             <a:endParaRPr lang="en-US"/>
           </a:p>
@@ -2387,7 +2387,7 @@
           <a:p>
             <a:fld id="{ACF1A1B0-862D-4909-A7DB-D8ADA062DFCA}" type="datetimeFigureOut">
               <a:rPr lang="en-US" dirty="0"/>
-              <a:t>3/23/2021</a:t>
+              <a:t>3/24/2021</a:t>
             </a:fld>
             <a:endParaRPr lang="en-US"/>
           </a:p>
@@ -2610,7 +2610,7 @@
           <a:p>
             <a:fld id="{7B156144-9CB7-4E3A-B87E-A382F9BE05EF}" type="datetimeFigureOut">
               <a:rPr lang="en-US" dirty="0"/>
-              <a:t>3/23/2021</a:t>
+              <a:t>3/24/2021</a:t>
             </a:fld>
             <a:endParaRPr lang="en-US"/>
           </a:p>
@@ -2788,7 +2788,7 @@
           <a:p>
             <a:fld id="{2643D55F-46AB-4791-9172-4FA8DD3A6A9C}" type="datetimeFigureOut">
               <a:rPr lang="en-US" dirty="0"/>
-              <a:t>3/23/2021</a:t>
+              <a:t>3/24/2021</a:t>
             </a:fld>
             <a:endParaRPr lang="en-US"/>
           </a:p>
@@ -2956,7 +2956,7 @@
           <a:p>
             <a:fld id="{58026881-8A08-449C-8D73-E5F201F814C1}" type="datetimeFigureOut">
               <a:rPr lang="en-US" dirty="0"/>
-              <a:t>3/23/2021</a:t>
+              <a:t>3/24/2021</a:t>
             </a:fld>
             <a:endParaRPr lang="en-US"/>
           </a:p>
@@ -3246,7 +3246,7 @@
           <a:p>
             <a:fld id="{1BEB5A5E-0C07-4E93-A112-D37B4D166B30}" type="datetimeFigureOut">
               <a:rPr lang="en-US" dirty="0"/>
-              <a:t>3/23/2021</a:t>
+              <a:t>3/24/2021</a:t>
             </a:fld>
             <a:endParaRPr lang="en-US"/>
           </a:p>
@@ -3569,7 +3569,7 @@
           <a:p>
             <a:fld id="{9E1F71C5-DC57-4358-A1EA-30C08AF6E3C5}" type="datetimeFigureOut">
               <a:rPr lang="en-US" dirty="0"/>
-              <a:t>3/23/2021</a:t>
+              <a:t>3/24/2021</a:t>
             </a:fld>
             <a:endParaRPr lang="en-US"/>
           </a:p>
@@ -3978,7 +3978,7 @@
           <a:p>
             <a:fld id="{12571DBA-DE60-4731-B773-47AAA185C143}" type="datetimeFigureOut">
               <a:rPr lang="en-US" dirty="0"/>
-              <a:t>3/23/2021</a:t>
+              <a:t>3/24/2021</a:t>
             </a:fld>
             <a:endParaRPr lang="en-US"/>
           </a:p>
@@ -4095,7 +4095,7 @@
           <a:p>
             <a:fld id="{4F170639-886C-4FCF-9EAB-ABB5DA3F3F4A}" type="datetimeFigureOut">
               <a:rPr lang="en-US" dirty="0"/>
-              <a:t>3/23/2021</a:t>
+              <a:t>3/24/2021</a:t>
             </a:fld>
             <a:endParaRPr lang="en-US"/>
           </a:p>
@@ -4190,7 +4190,7 @@
           <a:p>
             <a:fld id="{34C4A628-C83B-4C66-83F4-1711CE3738FD}" type="datetimeFigureOut">
               <a:rPr lang="en-US" dirty="0"/>
-              <a:t>3/23/2021</a:t>
+              <a:t>3/24/2021</a:t>
             </a:fld>
             <a:endParaRPr lang="en-US"/>
           </a:p>
@@ -4475,7 +4475,7 @@
           <a:p>
             <a:fld id="{B88C1D73-9400-43CA-A37F-F9B7D00DE14C}" type="datetimeFigureOut">
               <a:rPr lang="en-US" dirty="0"/>
-              <a:t>3/23/2021</a:t>
+              <a:t>3/24/2021</a:t>
             </a:fld>
             <a:endParaRPr lang="en-US"/>
           </a:p>
@@ -4747,7 +4747,7 @@
           <a:p>
             <a:fld id="{188B7711-B905-4633-B4D7-6F3A49A2E7D9}" type="datetimeFigureOut">
               <a:rPr lang="en-US" dirty="0"/>
-              <a:t>3/23/2021</a:t>
+              <a:t>3/24/2021</a:t>
             </a:fld>
             <a:endParaRPr lang="en-US"/>
           </a:p>
@@ -4997,7 +4997,7 @@
             <a:fld id="{89C235CF-BDA2-4E7E-8BBD-350479985E74}" type="datetimeFigureOut">
               <a:rPr lang="en-US" dirty="0"/>
               <a:pPr/>
-              <a:t>3/23/2021</a:t>
+              <a:t>3/24/2021</a:t>
             </a:fld>
             <a:endParaRPr lang="en-US"/>
           </a:p>
@@ -6186,19 +6186,13 @@
                 <a:effectLst/>
                 <a:latin typeface="Slack-Lato"/>
               </a:rPr>
-              <a:t>SoftwareStar</a:t>
-            </a:r>
-            <a:r>
-              <a:rPr lang="en-US" b="1" i="0" dirty="0">
-                <a:solidFill>
-                  <a:srgbClr val="1D1C1D"/>
-                </a:solidFill>
-                <a:effectLst/>
-                <a:latin typeface="Slack-Lato"/>
-              </a:rPr>
-              <a:t> </a:t>
-            </a:r>
-            <a:endParaRPr lang="en-US" dirty="0"/>
+              <a:t>TopTechnologist</a:t>
+            </a:r>
+            <a:endParaRPr lang="en-US" dirty="0">
+              <a:solidFill>
+                <a:schemeClr val="tx1"/>
+              </a:solidFill>
+            </a:endParaRPr>
           </a:p>
         </p:txBody>
       </p:sp>

</xml_diff>